<commit_message>
Opdateret tegning med begrebsmodel og kontekst tegning til v3
</commit_message>
<xml_diff>
--- a/Rambøll figurer.pptx
+++ b/Rambøll figurer.pptx
@@ -537,7 +537,7 @@
             <a:fld id="{0F5B7C09-5A60-450F-8B1D-B16CDE8563A2}" type="datetime1">
               <a:rPr lang="en-GB" noProof="0" smtClean="0"/>
               <a:pPr/>
-              <a:t>21/11/2019</a:t>
+              <a:t>04/12/2019</a:t>
             </a:fld>
             <a:endParaRPr lang="en-GB" noProof="0"/>
           </a:p>
@@ -41016,7 +41016,7 @@
           <a:graphicData uri="http://schemas.openxmlformats.org/presentationml/2006/ole">
             <mc:AlternateContent xmlns:mc="http://schemas.openxmlformats.org/markup-compatibility/2006">
               <mc:Choice xmlns:v="urn:schemas-microsoft-com:vml" Requires="v">
-                <p:oleObj spid="_x0000_s1140" name="Acrobat Document" r:id="rId4" imgW="5667480" imgH="8020080" progId="AcroExch.Document.11">
+                <p:oleObj spid="_x0000_s1143" name="Acrobat Document" r:id="rId4" imgW="5667480" imgH="8020080" progId="AcroExch.Document.11">
                   <p:embed/>
                 </p:oleObj>
               </mc:Choice>
@@ -41097,15 +41097,16 @@
         <p:nvCxnSpPr>
           <p:cNvPr id="42" name="Straight Connector 41"/>
           <p:cNvCxnSpPr>
+            <a:cxnSpLocks/>
             <a:stCxn id="48" idx="3"/>
             <a:endCxn id="91" idx="1"/>
           </p:cNvCxnSpPr>
           <p:nvPr/>
         </p:nvCxnSpPr>
         <p:spPr>
-          <a:xfrm flipV="1">
-            <a:off x="7779222" y="3724137"/>
-            <a:ext cx="1514855" cy="2875"/>
+          <a:xfrm>
+            <a:off x="8008712" y="3759137"/>
+            <a:ext cx="1402613" cy="14211"/>
           </a:xfrm>
           <a:prstGeom prst="line">
             <a:avLst/>
@@ -41184,7 +41185,7 @@
         <p:spPr>
           <a:xfrm>
             <a:off x="3206000" y="1678917"/>
-            <a:ext cx="1631969" cy="672230"/>
+            <a:ext cx="1725457" cy="672230"/>
           </a:xfrm>
           <a:prstGeom prst="rect">
             <a:avLst/>
@@ -41211,17 +41212,9 @@
           <a:p>
             <a:pPr algn="ctr"/>
             <a:r>
-              <a:rPr lang="da-DK" sz="1600"/>
+              <a:rPr lang="da-DK" sz="1600" dirty="0"/>
               <a:t>Identitet</a:t>
             </a:r>
-          </a:p>
-          <a:p>
-            <a:pPr algn="ctr"/>
-            <a:r>
-              <a:rPr lang="da-DK" sz="1600"/>
-              <a:t>(eID)</a:t>
-            </a:r>
-            <a:endParaRPr lang="da-DK" sz="1000" dirty="0"/>
           </a:p>
         </p:txBody>
       </p:sp>
@@ -41233,7 +41226,7 @@
         </p:nvSpPr>
         <p:spPr>
           <a:xfrm>
-            <a:off x="6314282" y="1674905"/>
+            <a:off x="6536813" y="1674905"/>
             <a:ext cx="1311830" cy="672230"/>
           </a:xfrm>
           <a:prstGeom prst="rect">
@@ -41275,8 +41268,8 @@
         </p:nvSpPr>
         <p:spPr>
           <a:xfrm>
-            <a:off x="6147253" y="3390897"/>
-            <a:ext cx="1631969" cy="672230"/>
+            <a:off x="6376743" y="3452946"/>
+            <a:ext cx="1631969" cy="612382"/>
           </a:xfrm>
           <a:prstGeom prst="rect">
             <a:avLst/>
@@ -41347,7 +41340,7 @@
               </a:spcAft>
             </a:pPr>
             <a:r>
-              <a:rPr lang="da-DK" sz="1200" b="1" i="1" dirty="0">
+              <a:rPr lang="da-DK" sz="1200" i="1" dirty="0">
                 <a:solidFill>
                   <a:schemeClr val="accent5"/>
                 </a:solidFill>
@@ -41368,7 +41361,7 @@
         <p:spPr>
           <a:xfrm>
             <a:off x="3220224" y="3397120"/>
-            <a:ext cx="1631969" cy="672230"/>
+            <a:ext cx="1711234" cy="672230"/>
           </a:xfrm>
           <a:prstGeom prst="rect">
             <a:avLst/>
@@ -41396,7 +41389,7 @@
             <a:pPr algn="ctr"/>
             <a:r>
               <a:rPr lang="da-DK" sz="1600" dirty="0"/>
-              <a:t>Akkreditiv</a:t>
+              <a:t>Identifikationsmiddel</a:t>
             </a:r>
           </a:p>
         </p:txBody>
@@ -41405,6 +41398,7 @@
         <p:nvCxnSpPr>
           <p:cNvPr id="59" name="Straight Connector 58"/>
           <p:cNvCxnSpPr>
+            <a:cxnSpLocks/>
             <a:stCxn id="44" idx="3"/>
             <a:endCxn id="58" idx="1"/>
           </p:cNvCxnSpPr>
@@ -41478,24 +41472,14 @@
               </a:spcAft>
             </a:pPr>
             <a:r>
-              <a:rPr lang="da-DK" sz="1200" b="1" i="1">
+              <a:rPr lang="da-DK" sz="1200" i="1" dirty="0">
                 <a:solidFill>
                   <a:schemeClr val="accent5"/>
                 </a:solidFill>
                 <a:latin typeface="Verdana"/>
                 <a:cs typeface="ＭＳ Ｐゴシック" pitchFamily="-111" charset="-128"/>
               </a:rPr>
-              <a:t>Anvender </a:t>
-            </a:r>
-            <a:r>
-              <a:rPr lang="da-DK" sz="1200" b="1" i="1" dirty="0">
-                <a:solidFill>
-                  <a:schemeClr val="accent5"/>
-                </a:solidFill>
-                <a:latin typeface="Verdana"/>
-                <a:cs typeface="ＭＳ Ｐゴシック" pitchFamily="-111" charset="-128"/>
-              </a:rPr>
-              <a:t>et eller flere</a:t>
+              <a:t>Anvender et eller flere</a:t>
             </a:r>
           </a:p>
         </p:txBody>
@@ -41504,6 +41488,7 @@
         <p:nvCxnSpPr>
           <p:cNvPr id="64" name="Straight Connector 63"/>
           <p:cNvCxnSpPr>
+            <a:cxnSpLocks/>
             <a:stCxn id="58" idx="0"/>
             <a:endCxn id="45" idx="2"/>
           </p:cNvCxnSpPr>
@@ -41511,8 +41496,8 @@
         </p:nvCxnSpPr>
         <p:spPr>
           <a:xfrm flipH="1" flipV="1">
-            <a:off x="4021985" y="2351147"/>
-            <a:ext cx="14224" cy="1045973"/>
+            <a:off x="4068729" y="2351147"/>
+            <a:ext cx="7112" cy="1045973"/>
           </a:xfrm>
           <a:prstGeom prst="line">
             <a:avLst/>
@@ -41543,6 +41528,7 @@
         <p:nvCxnSpPr>
           <p:cNvPr id="67" name="Straight Connector 66"/>
           <p:cNvCxnSpPr>
+            <a:cxnSpLocks/>
             <a:stCxn id="44" idx="3"/>
             <a:endCxn id="45" idx="1"/>
           </p:cNvCxnSpPr>
@@ -41586,8 +41572,8 @@
         </p:nvSpPr>
         <p:spPr bwMode="auto">
           <a:xfrm>
-            <a:off x="3364720" y="2604141"/>
-            <a:ext cx="1247976" cy="553998"/>
+            <a:off x="4400241" y="2677158"/>
+            <a:ext cx="1247976" cy="369332"/>
           </a:xfrm>
           <a:prstGeom prst="rect">
             <a:avLst/>
@@ -41616,7 +41602,7 @@
               </a:spcAft>
             </a:pPr>
             <a:r>
-              <a:rPr lang="da-DK" sz="1200" b="1" i="1">
+              <a:rPr lang="da-DK" sz="1200" i="1" dirty="0">
                 <a:solidFill>
                   <a:schemeClr val="accent5"/>
                 </a:solidFill>
@@ -41625,13 +41611,6 @@
               </a:rPr>
               <a:t>Associeres med en eller flere</a:t>
             </a:r>
-            <a:endParaRPr lang="da-DK" sz="1200" b="1" i="1" dirty="0">
-              <a:solidFill>
-                <a:schemeClr val="accent5"/>
-              </a:solidFill>
-              <a:latin typeface="Verdana"/>
-              <a:cs typeface="ＭＳ Ｐゴシック" pitchFamily="-111" charset="-128"/>
-            </a:endParaRPr>
           </a:p>
         </p:txBody>
       </p:sp>
@@ -41643,8 +41622,8 @@
         </p:nvSpPr>
         <p:spPr>
           <a:xfrm>
-            <a:off x="9389077" y="4466873"/>
-            <a:ext cx="1631969" cy="486726"/>
+            <a:off x="9411321" y="4633128"/>
+            <a:ext cx="1817744" cy="666236"/>
           </a:xfrm>
           <a:prstGeom prst="rect">
             <a:avLst/>
@@ -41678,7 +41657,7 @@
             <a:pPr algn="ctr"/>
             <a:r>
               <a:rPr lang="da-DK" sz="1600" dirty="0"/>
-              <a:t>Tjeneste</a:t>
+              <a:t>Forretnings-tjeneste</a:t>
             </a:r>
           </a:p>
         </p:txBody>
@@ -41687,6 +41666,7 @@
         <p:nvCxnSpPr>
           <p:cNvPr id="81" name="Straight Connector 80"/>
           <p:cNvCxnSpPr>
+            <a:cxnSpLocks/>
             <a:stCxn id="45" idx="3"/>
             <a:endCxn id="46" idx="1"/>
           </p:cNvCxnSpPr>
@@ -41694,8 +41674,8 @@
         </p:nvCxnSpPr>
         <p:spPr>
           <a:xfrm flipV="1">
-            <a:off x="4837969" y="2011020"/>
-            <a:ext cx="1476313" cy="4012"/>
+            <a:off x="4931457" y="2011020"/>
+            <a:ext cx="1605356" cy="4012"/>
           </a:xfrm>
           <a:prstGeom prst="line">
             <a:avLst/>
@@ -41767,7 +41747,7 @@
         </p:nvCxnSpPr>
         <p:spPr>
           <a:xfrm flipV="1">
-            <a:off x="4589473" y="2513280"/>
+            <a:off x="4316341" y="2528952"/>
             <a:ext cx="0" cy="665743"/>
           </a:xfrm>
           <a:prstGeom prst="straightConnector1">
@@ -41805,7 +41785,7 @@
         </p:nvCxnSpPr>
         <p:spPr>
           <a:xfrm rot="5400000" flipV="1">
-            <a:off x="5585395" y="1435436"/>
+            <a:off x="5734135" y="1571252"/>
             <a:ext cx="0" cy="665743"/>
           </a:xfrm>
           <a:prstGeom prst="straightConnector1">
@@ -41839,15 +41819,16 @@
         <p:nvCxnSpPr>
           <p:cNvPr id="85" name="Straight Connector 84"/>
           <p:cNvCxnSpPr>
+            <a:cxnSpLocks/>
             <a:stCxn id="46" idx="2"/>
             <a:endCxn id="48" idx="0"/>
           </p:cNvCxnSpPr>
           <p:nvPr/>
         </p:nvCxnSpPr>
         <p:spPr>
-          <a:xfrm flipH="1">
-            <a:off x="6963238" y="2347135"/>
-            <a:ext cx="6959" cy="1043762"/>
+          <a:xfrm>
+            <a:off x="7192728" y="2347135"/>
+            <a:ext cx="0" cy="1105811"/>
           </a:xfrm>
           <a:prstGeom prst="line">
             <a:avLst/>
@@ -41884,7 +41865,7 @@
         </p:nvCxnSpPr>
         <p:spPr>
           <a:xfrm>
-            <a:off x="7932186" y="3823351"/>
+            <a:off x="8143837" y="3690809"/>
             <a:ext cx="1132362" cy="0"/>
           </a:xfrm>
           <a:prstGeom prst="straightConnector1">
@@ -41921,8 +41902,8 @@
         </p:nvSpPr>
         <p:spPr>
           <a:xfrm>
-            <a:off x="9294077" y="3480774"/>
-            <a:ext cx="1817745" cy="486726"/>
+            <a:off x="9411325" y="3477355"/>
+            <a:ext cx="1817745" cy="591985"/>
           </a:xfrm>
           <a:prstGeom prst="rect">
             <a:avLst/>
@@ -41960,15 +41941,16 @@
         <p:nvCxnSpPr>
           <p:cNvPr id="92" name="Straight Connector 91"/>
           <p:cNvCxnSpPr>
+            <a:cxnSpLocks/>
             <a:stCxn id="91" idx="2"/>
             <a:endCxn id="76" idx="0"/>
           </p:cNvCxnSpPr>
           <p:nvPr/>
         </p:nvCxnSpPr>
         <p:spPr>
-          <a:xfrm>
-            <a:off x="10202950" y="3967500"/>
-            <a:ext cx="2112" cy="499373"/>
+          <a:xfrm flipH="1">
+            <a:off x="10320193" y="4069340"/>
+            <a:ext cx="5" cy="563788"/>
           </a:xfrm>
           <a:prstGeom prst="line">
             <a:avLst/>
@@ -42003,7 +41985,7 @@
         </p:nvSpPr>
         <p:spPr bwMode="auto">
           <a:xfrm>
-            <a:off x="10088598" y="4176037"/>
+            <a:off x="10570641" y="4258901"/>
             <a:ext cx="1081922" cy="184666"/>
           </a:xfrm>
           <a:prstGeom prst="rect">
@@ -42033,7 +42015,7 @@
               </a:spcAft>
             </a:pPr>
             <a:r>
-              <a:rPr lang="da-DK" sz="1200" b="1" i="1">
+              <a:rPr lang="da-DK" sz="1200" i="1" dirty="0">
                 <a:solidFill>
                   <a:schemeClr val="tx2">
                     <a:lumMod val="75000"/>
@@ -42044,15 +42026,6 @@
               </a:rPr>
               <a:t>Definerer</a:t>
             </a:r>
-            <a:endParaRPr lang="da-DK" sz="1200" b="1" i="1" dirty="0">
-              <a:solidFill>
-                <a:schemeClr val="tx2">
-                  <a:lumMod val="75000"/>
-                </a:schemeClr>
-              </a:solidFill>
-              <a:latin typeface="Verdana"/>
-              <a:cs typeface="ＭＳ Ｐゴシック" pitchFamily="-111" charset="-128"/>
-            </a:endParaRPr>
           </a:p>
         </p:txBody>
       </p:sp>
@@ -42064,7 +42037,7 @@
         </p:nvCxnSpPr>
         <p:spPr>
           <a:xfrm flipV="1">
-            <a:off x="10069749" y="4080119"/>
+            <a:off x="10485385" y="4148441"/>
             <a:ext cx="0" cy="295126"/>
           </a:xfrm>
           <a:prstGeom prst="straightConnector1">
@@ -42138,7 +42111,7 @@
         </p:nvSpPr>
         <p:spPr bwMode="auto">
           <a:xfrm>
-            <a:off x="7528807" y="3436928"/>
+            <a:off x="7696865" y="3421334"/>
             <a:ext cx="1932283" cy="184708"/>
           </a:xfrm>
           <a:prstGeom prst="rect">
@@ -42168,24 +42141,14 @@
               </a:spcAft>
             </a:pPr>
             <a:r>
-              <a:rPr lang="da-DK" sz="1200" b="1" i="1">
+              <a:rPr lang="da-DK" sz="1200" i="1" dirty="0">
                 <a:solidFill>
                   <a:schemeClr val="accent5"/>
                 </a:solidFill>
                 <a:latin typeface="Verdana"/>
                 <a:cs typeface="ＭＳ Ｐゴシック" pitchFamily="-111" charset="-128"/>
               </a:rPr>
-              <a:t>Matches </a:t>
-            </a:r>
-            <a:r>
-              <a:rPr lang="da-DK" sz="1200" b="1" i="1" dirty="0">
-                <a:solidFill>
-                  <a:schemeClr val="accent5"/>
-                </a:solidFill>
-                <a:latin typeface="Verdana"/>
-                <a:cs typeface="ＭＳ Ｐゴシック" pitchFamily="-111" charset="-128"/>
-              </a:rPr>
-              <a:t>med</a:t>
+              <a:t>Matches med</a:t>
             </a:r>
           </a:p>
         </p:txBody>
@@ -42198,8 +42161,8 @@
         </p:nvSpPr>
         <p:spPr bwMode="auto">
           <a:xfrm>
-            <a:off x="4826008" y="1827406"/>
-            <a:ext cx="1513727" cy="369332"/>
+            <a:off x="4958767" y="1441216"/>
+            <a:ext cx="1550735" cy="369332"/>
           </a:xfrm>
           <a:prstGeom prst="rect">
             <a:avLst/>
@@ -42228,24 +42191,14 @@
               </a:spcAft>
             </a:pPr>
             <a:r>
-              <a:rPr lang="da-DK" sz="1200" b="1" i="1">
+              <a:rPr lang="da-DK" sz="1200" i="1" dirty="0">
                 <a:solidFill>
                   <a:schemeClr val="accent5"/>
                 </a:solidFill>
                 <a:latin typeface="Verdana"/>
                 <a:cs typeface="ＭＳ Ｐゴシック" pitchFamily="-111" charset="-128"/>
               </a:rPr>
-              <a:t>Associeres </a:t>
-            </a:r>
-            <a:r>
-              <a:rPr lang="da-DK" sz="1200" b="1" i="1" dirty="0">
-                <a:solidFill>
-                  <a:schemeClr val="accent5"/>
-                </a:solidFill>
-                <a:latin typeface="Verdana"/>
-                <a:cs typeface="ＭＳ Ｐゴシック" pitchFamily="-111" charset="-128"/>
-              </a:rPr>
-              <a:t>med en eller flere</a:t>
+              <a:t>Associeres med en eller flere</a:t>
             </a:r>
           </a:p>
         </p:txBody>
@@ -42258,7 +42211,7 @@
         </p:nvCxnSpPr>
         <p:spPr>
           <a:xfrm flipV="1">
-            <a:off x="7154837" y="2690639"/>
+            <a:off x="7366659" y="2678405"/>
             <a:ext cx="1" cy="333745"/>
           </a:xfrm>
           <a:prstGeom prst="straightConnector1">
@@ -42295,7 +42248,7 @@
         </p:nvSpPr>
         <p:spPr bwMode="auto">
           <a:xfrm>
-            <a:off x="7154837" y="2756644"/>
+            <a:off x="7308538" y="2699568"/>
             <a:ext cx="1513727" cy="369332"/>
           </a:xfrm>
           <a:prstGeom prst="rect">
@@ -42325,7 +42278,7 @@
               </a:spcAft>
             </a:pPr>
             <a:r>
-              <a:rPr lang="da-DK" sz="1200" b="1" i="1" dirty="0">
+              <a:rPr lang="da-DK" sz="1200" i="1" dirty="0">
                 <a:solidFill>
                   <a:schemeClr val="accent5"/>
                 </a:solidFill>

</xml_diff>